<commit_message>
Addressed comments in buckchat use case diagram
</commit_message>
<xml_diff>
--- a/docs/sprint3/archives/buckchat-use-case-diagram.pptx
+++ b/docs/sprint3/archives/buckchat-use-case-diagram.pptx
@@ -289,7 +289,7 @@
             <a:fld id="{8811A36A-77B8-4029-BAA5-5F6CA72C94AD}" type="datetimeFigureOut">
               <a:rPr lang="en-IN" smtClean="0"/>
               <a:pPr/>
-              <a:t>07-12-2016</a:t>
+              <a:t>12/7/16</a:t>
             </a:fld>
             <a:endParaRPr lang="en-IN"/>
           </a:p>
@@ -456,7 +456,7 @@
             <a:fld id="{8811A36A-77B8-4029-BAA5-5F6CA72C94AD}" type="datetimeFigureOut">
               <a:rPr lang="en-IN" smtClean="0"/>
               <a:pPr/>
-              <a:t>07-12-2016</a:t>
+              <a:t>12/7/16</a:t>
             </a:fld>
             <a:endParaRPr lang="en-IN"/>
           </a:p>
@@ -633,7 +633,7 @@
             <a:fld id="{8811A36A-77B8-4029-BAA5-5F6CA72C94AD}" type="datetimeFigureOut">
               <a:rPr lang="en-IN" smtClean="0"/>
               <a:pPr/>
-              <a:t>07-12-2016</a:t>
+              <a:t>12/7/16</a:t>
             </a:fld>
             <a:endParaRPr lang="en-IN"/>
           </a:p>
@@ -800,7 +800,7 @@
             <a:fld id="{8811A36A-77B8-4029-BAA5-5F6CA72C94AD}" type="datetimeFigureOut">
               <a:rPr lang="en-IN" smtClean="0"/>
               <a:pPr/>
-              <a:t>07-12-2016</a:t>
+              <a:t>12/7/16</a:t>
             </a:fld>
             <a:endParaRPr lang="en-IN"/>
           </a:p>
@@ -1043,7 +1043,7 @@
             <a:fld id="{8811A36A-77B8-4029-BAA5-5F6CA72C94AD}" type="datetimeFigureOut">
               <a:rPr lang="en-IN" smtClean="0"/>
               <a:pPr/>
-              <a:t>07-12-2016</a:t>
+              <a:t>12/7/16</a:t>
             </a:fld>
             <a:endParaRPr lang="en-IN"/>
           </a:p>
@@ -1328,7 +1328,7 @@
             <a:fld id="{8811A36A-77B8-4029-BAA5-5F6CA72C94AD}" type="datetimeFigureOut">
               <a:rPr lang="en-IN" smtClean="0"/>
               <a:pPr/>
-              <a:t>07-12-2016</a:t>
+              <a:t>12/7/16</a:t>
             </a:fld>
             <a:endParaRPr lang="en-IN"/>
           </a:p>
@@ -1747,7 +1747,7 @@
             <a:fld id="{8811A36A-77B8-4029-BAA5-5F6CA72C94AD}" type="datetimeFigureOut">
               <a:rPr lang="en-IN" smtClean="0"/>
               <a:pPr/>
-              <a:t>07-12-2016</a:t>
+              <a:t>12/7/16</a:t>
             </a:fld>
             <a:endParaRPr lang="en-IN"/>
           </a:p>
@@ -1862,7 +1862,7 @@
             <a:fld id="{8811A36A-77B8-4029-BAA5-5F6CA72C94AD}" type="datetimeFigureOut">
               <a:rPr lang="en-IN" smtClean="0"/>
               <a:pPr/>
-              <a:t>07-12-2016</a:t>
+              <a:t>12/7/16</a:t>
             </a:fld>
             <a:endParaRPr lang="en-IN"/>
           </a:p>
@@ -1954,7 +1954,7 @@
             <a:fld id="{8811A36A-77B8-4029-BAA5-5F6CA72C94AD}" type="datetimeFigureOut">
               <a:rPr lang="en-IN" smtClean="0"/>
               <a:pPr/>
-              <a:t>07-12-2016</a:t>
+              <a:t>12/7/16</a:t>
             </a:fld>
             <a:endParaRPr lang="en-IN"/>
           </a:p>
@@ -2228,7 +2228,7 @@
             <a:fld id="{8811A36A-77B8-4029-BAA5-5F6CA72C94AD}" type="datetimeFigureOut">
               <a:rPr lang="en-IN" smtClean="0"/>
               <a:pPr/>
-              <a:t>07-12-2016</a:t>
+              <a:t>12/7/16</a:t>
             </a:fld>
             <a:endParaRPr lang="en-IN"/>
           </a:p>
@@ -2478,7 +2478,7 @@
             <a:fld id="{8811A36A-77B8-4029-BAA5-5F6CA72C94AD}" type="datetimeFigureOut">
               <a:rPr lang="en-IN" smtClean="0"/>
               <a:pPr/>
-              <a:t>07-12-2016</a:t>
+              <a:t>12/7/16</a:t>
             </a:fld>
             <a:endParaRPr lang="en-IN"/>
           </a:p>
@@ -2688,7 +2688,7 @@
             <a:fld id="{8811A36A-77B8-4029-BAA5-5F6CA72C94AD}" type="datetimeFigureOut">
               <a:rPr lang="en-IN" smtClean="0"/>
               <a:pPr/>
-              <a:t>07-12-2016</a:t>
+              <a:t>12/7/16</a:t>
             </a:fld>
             <a:endParaRPr lang="en-IN"/>
           </a:p>
@@ -3067,7 +3067,7 @@
         </p:nvSpPr>
         <p:spPr>
           <a:xfrm>
-            <a:off x="4306453" y="1501159"/>
+            <a:off x="2843808" y="4509120"/>
             <a:ext cx="1723803" cy="697199"/>
           </a:xfrm>
           <a:prstGeom prst="ellipse">
@@ -3114,7 +3114,7 @@
         </p:nvSpPr>
         <p:spPr>
           <a:xfrm>
-            <a:off x="4479154" y="4382231"/>
+            <a:off x="3347864" y="5589240"/>
             <a:ext cx="1452981" cy="719328"/>
           </a:xfrm>
           <a:prstGeom prst="ellipse">
@@ -3155,14 +3155,206 @@
       </p:sp>
       <p:sp>
         <p:nvSpPr>
-          <p:cNvPr id="6" name="Rectangle 5"/>
+          <p:cNvPr id="9" name="TextBox 8"/>
+          <p:cNvSpPr txBox="1"/>
+          <p:nvPr/>
+        </p:nvSpPr>
+        <p:spPr>
+          <a:xfrm>
+            <a:off x="2771666" y="332656"/>
+            <a:ext cx="3851824" cy="461665"/>
+          </a:xfrm>
+          <a:prstGeom prst="rect">
+            <a:avLst/>
+          </a:prstGeom>
+          <a:noFill/>
+        </p:spPr>
+        <p:txBody>
+          <a:bodyPr wrap="none" rtlCol="0">
+            <a:spAutoFit/>
+          </a:bodyPr>
+          <a:lstStyle/>
+          <a:p>
+            <a:r>
+              <a:rPr lang="en-US" sz="2400" b="1" dirty="0" err="1" smtClean="0"/>
+              <a:t>Buckchat</a:t>
+            </a:r>
+            <a:r>
+              <a:rPr lang="en-US" sz="2400" b="1" dirty="0" smtClean="0"/>
+              <a:t> – Use Case diagram</a:t>
+            </a:r>
+            <a:endParaRPr lang="en-US" sz="2400" b="1" dirty="0"/>
+          </a:p>
+        </p:txBody>
+      </p:sp>
+      <p:pic>
+        <p:nvPicPr>
+          <p:cNvPr id="10" name="Picture 9"/>
+          <p:cNvPicPr>
+            <a:picLocks noChangeAspect="1"/>
+          </p:cNvPicPr>
+          <p:nvPr/>
+        </p:nvPicPr>
+        <p:blipFill>
+          <a:blip r:embed="rId2" cstate="print">
+            <a:extLst>
+              <a:ext uri="{28A0092B-C50C-407E-A947-70E740481C1C}">
+                <a14:useLocalDpi xmlns:a14="http://schemas.microsoft.com/office/drawing/2010/main" val="0"/>
+              </a:ext>
+            </a:extLst>
+          </a:blip>
+          <a:stretch>
+            <a:fillRect/>
+          </a:stretch>
+        </p:blipFill>
+        <p:spPr>
+          <a:xfrm>
+            <a:off x="35496" y="2864225"/>
+            <a:ext cx="1326930" cy="1275097"/>
+          </a:xfrm>
+          <a:prstGeom prst="rect">
+            <a:avLst/>
+          </a:prstGeom>
+        </p:spPr>
+      </p:pic>
+      <p:sp>
+        <p:nvSpPr>
+          <p:cNvPr id="11" name="TextBox 10"/>
+          <p:cNvSpPr txBox="1"/>
+          <p:nvPr/>
+        </p:nvSpPr>
+        <p:spPr>
+          <a:xfrm>
+            <a:off x="396572" y="3824975"/>
+            <a:ext cx="617477" cy="369332"/>
+          </a:xfrm>
+          <a:prstGeom prst="rect">
+            <a:avLst/>
+          </a:prstGeom>
+          <a:noFill/>
+        </p:spPr>
+        <p:txBody>
+          <a:bodyPr wrap="none" rtlCol="0">
+            <a:spAutoFit/>
+          </a:bodyPr>
+          <a:lstStyle/>
+          <a:p>
+            <a:r>
+              <a:rPr lang="en-US" dirty="0" smtClean="0"/>
+              <a:t>User</a:t>
+            </a:r>
+            <a:endParaRPr lang="en-US" dirty="0"/>
+          </a:p>
+        </p:txBody>
+      </p:sp>
+      <p:sp>
+        <p:nvSpPr>
+          <p:cNvPr id="12" name="Oval 11"/>
           <p:cNvSpPr/>
           <p:nvPr/>
         </p:nvSpPr>
         <p:spPr>
           <a:xfrm>
-            <a:off x="4139952" y="1412776"/>
-            <a:ext cx="2160240" cy="3823580"/>
+            <a:off x="4788024" y="1772816"/>
+            <a:ext cx="1876539" cy="855760"/>
+          </a:xfrm>
+          <a:prstGeom prst="ellipse">
+            <a:avLst/>
+          </a:prstGeom>
+          <a:ln>
+            <a:solidFill>
+              <a:schemeClr val="tx1"/>
+            </a:solidFill>
+          </a:ln>
+        </p:spPr>
+        <p:style>
+          <a:lnRef idx="2">
+            <a:schemeClr val="accent6"/>
+          </a:lnRef>
+          <a:fillRef idx="1">
+            <a:schemeClr val="lt1"/>
+          </a:fillRef>
+          <a:effectRef idx="0">
+            <a:schemeClr val="accent6"/>
+          </a:effectRef>
+          <a:fontRef idx="minor">
+            <a:schemeClr val="dk1"/>
+          </a:fontRef>
+        </p:style>
+        <p:txBody>
+          <a:bodyPr rtlCol="0" anchor="ctr"/>
+          <a:lstStyle/>
+          <a:p>
+            <a:pPr algn="ctr"/>
+            <a:r>
+              <a:rPr lang="en-US" dirty="0" smtClean="0"/>
+              <a:t>Create anonymous drips</a:t>
+            </a:r>
+            <a:endParaRPr lang="en-US" dirty="0"/>
+          </a:p>
+        </p:txBody>
+      </p:sp>
+      <p:sp>
+        <p:nvSpPr>
+          <p:cNvPr id="14" name="Oval 13"/>
+          <p:cNvSpPr/>
+          <p:nvPr/>
+        </p:nvSpPr>
+        <p:spPr>
+          <a:xfrm>
+            <a:off x="5508104" y="4149080"/>
+            <a:ext cx="1596997" cy="832901"/>
+          </a:xfrm>
+          <a:prstGeom prst="ellipse">
+            <a:avLst/>
+          </a:prstGeom>
+          <a:ln>
+            <a:solidFill>
+              <a:schemeClr val="tx1"/>
+            </a:solidFill>
+          </a:ln>
+        </p:spPr>
+        <p:style>
+          <a:lnRef idx="2">
+            <a:schemeClr val="accent6"/>
+          </a:lnRef>
+          <a:fillRef idx="1">
+            <a:schemeClr val="lt1"/>
+          </a:fillRef>
+          <a:effectRef idx="0">
+            <a:schemeClr val="accent6"/>
+          </a:effectRef>
+          <a:fontRef idx="minor">
+            <a:schemeClr val="dk1"/>
+          </a:fontRef>
+        </p:style>
+        <p:txBody>
+          <a:bodyPr rtlCol="0" anchor="ctr"/>
+          <a:lstStyle/>
+          <a:p>
+            <a:pPr algn="ctr"/>
+            <a:r>
+              <a:rPr lang="en-US" dirty="0" smtClean="0"/>
+              <a:t>View Bucket </a:t>
+            </a:r>
+            <a:r>
+              <a:rPr lang="en-US" dirty="0" smtClean="0"/>
+              <a:t>List</a:t>
+            </a:r>
+            <a:endParaRPr lang="en-US" dirty="0"/>
+          </a:p>
+        </p:txBody>
+      </p:sp>
+      <p:sp>
+        <p:nvSpPr>
+          <p:cNvPr id="15" name="Rectangle 14"/>
+          <p:cNvSpPr/>
+          <p:nvPr/>
+        </p:nvSpPr>
+        <p:spPr>
+          <a:xfrm>
+            <a:off x="1547664" y="1405620"/>
+            <a:ext cx="6120680" cy="4975708"/>
           </a:xfrm>
           <a:prstGeom prst="rect">
             <a:avLst/>
@@ -3201,309 +3393,13 @@
       </p:sp>
       <p:sp>
         <p:nvSpPr>
-          <p:cNvPr id="9" name="TextBox 8"/>
-          <p:cNvSpPr txBox="1"/>
-          <p:nvPr/>
-        </p:nvSpPr>
-        <p:spPr>
-          <a:xfrm>
-            <a:off x="2771666" y="332656"/>
-            <a:ext cx="3851824" cy="461665"/>
-          </a:xfrm>
-          <a:prstGeom prst="rect">
-            <a:avLst/>
-          </a:prstGeom>
-          <a:noFill/>
-        </p:spPr>
-        <p:txBody>
-          <a:bodyPr wrap="none" rtlCol="0">
-            <a:spAutoFit/>
-          </a:bodyPr>
-          <a:lstStyle/>
-          <a:p>
-            <a:r>
-              <a:rPr lang="en-US" sz="2400" b="1" dirty="0" err="1" smtClean="0"/>
-              <a:t>Buckchat</a:t>
-            </a:r>
-            <a:r>
-              <a:rPr lang="en-US" sz="2400" b="1" dirty="0" smtClean="0"/>
-              <a:t> – </a:t>
-            </a:r>
-            <a:r>
-              <a:rPr lang="en-US" sz="2400" b="1" dirty="0" smtClean="0"/>
-              <a:t>Use </a:t>
-            </a:r>
-            <a:r>
-              <a:rPr lang="en-US" sz="2400" b="1" dirty="0" smtClean="0"/>
-              <a:t>C</a:t>
-            </a:r>
-            <a:r>
-              <a:rPr lang="en-US" sz="2400" b="1" dirty="0" smtClean="0"/>
-              <a:t>ase </a:t>
-            </a:r>
-            <a:r>
-              <a:rPr lang="en-US" sz="2400" b="1" dirty="0" smtClean="0"/>
-              <a:t>diagram</a:t>
-            </a:r>
-            <a:endParaRPr lang="en-US" sz="2400" b="1" dirty="0"/>
-          </a:p>
-        </p:txBody>
-      </p:sp>
-      <p:pic>
-        <p:nvPicPr>
-          <p:cNvPr id="10" name="Picture 9"/>
-          <p:cNvPicPr>
-            <a:picLocks noChangeAspect="1"/>
-          </p:cNvPicPr>
-          <p:nvPr/>
-        </p:nvPicPr>
-        <p:blipFill>
-          <a:blip r:embed="rId2" cstate="print">
-            <a:extLst>
-              <a:ext uri="{28A0092B-C50C-407E-A947-70E740481C1C}">
-                <a14:useLocalDpi xmlns="" xmlns:a14="http://schemas.microsoft.com/office/drawing/2010/main" val="0"/>
-              </a:ext>
-            </a:extLst>
-          </a:blip>
-          <a:stretch>
-            <a:fillRect/>
-          </a:stretch>
-        </p:blipFill>
-        <p:spPr>
-          <a:xfrm>
-            <a:off x="35496" y="2864225"/>
-            <a:ext cx="1326930" cy="1275097"/>
-          </a:xfrm>
-          <a:prstGeom prst="rect">
-            <a:avLst/>
-          </a:prstGeom>
-        </p:spPr>
-      </p:pic>
-      <p:sp>
-        <p:nvSpPr>
-          <p:cNvPr id="11" name="TextBox 10"/>
-          <p:cNvSpPr txBox="1"/>
-          <p:nvPr/>
-        </p:nvSpPr>
-        <p:spPr>
-          <a:xfrm>
-            <a:off x="396572" y="3824975"/>
-            <a:ext cx="617477" cy="369332"/>
-          </a:xfrm>
-          <a:prstGeom prst="rect">
-            <a:avLst/>
-          </a:prstGeom>
-          <a:noFill/>
-        </p:spPr>
-        <p:txBody>
-          <a:bodyPr wrap="none" rtlCol="0">
-            <a:spAutoFit/>
-          </a:bodyPr>
-          <a:lstStyle/>
-          <a:p>
-            <a:r>
-              <a:rPr lang="en-US" dirty="0" smtClean="0"/>
-              <a:t>User</a:t>
-            </a:r>
-            <a:endParaRPr lang="en-US" dirty="0"/>
-          </a:p>
-        </p:txBody>
-      </p:sp>
-      <p:sp>
-        <p:nvSpPr>
-          <p:cNvPr id="12" name="Oval 11"/>
-          <p:cNvSpPr/>
-          <p:nvPr/>
-        </p:nvSpPr>
-        <p:spPr>
-          <a:xfrm>
-            <a:off x="4279637" y="2417463"/>
-            <a:ext cx="1876539" cy="855760"/>
-          </a:xfrm>
-          <a:prstGeom prst="ellipse">
-            <a:avLst/>
-          </a:prstGeom>
-          <a:ln>
-            <a:solidFill>
-              <a:schemeClr val="tx1"/>
-            </a:solidFill>
-          </a:ln>
-        </p:spPr>
-        <p:style>
-          <a:lnRef idx="2">
-            <a:schemeClr val="accent6"/>
-          </a:lnRef>
-          <a:fillRef idx="1">
-            <a:schemeClr val="lt1"/>
-          </a:fillRef>
-          <a:effectRef idx="0">
-            <a:schemeClr val="accent6"/>
-          </a:effectRef>
-          <a:fontRef idx="minor">
-            <a:schemeClr val="dk1"/>
-          </a:fontRef>
-        </p:style>
-        <p:txBody>
-          <a:bodyPr rtlCol="0" anchor="ctr"/>
-          <a:lstStyle/>
-          <a:p>
-            <a:pPr algn="ctr"/>
-            <a:r>
-              <a:rPr lang="en-US" dirty="0" smtClean="0"/>
-              <a:t>Create anonymous drips</a:t>
-            </a:r>
-            <a:endParaRPr lang="en-US" dirty="0"/>
-          </a:p>
-        </p:txBody>
-      </p:sp>
-      <p:sp>
-        <p:nvSpPr>
-          <p:cNvPr id="14" name="Oval 13"/>
-          <p:cNvSpPr/>
-          <p:nvPr/>
-        </p:nvSpPr>
-        <p:spPr>
-          <a:xfrm>
-            <a:off x="4487171" y="3460195"/>
-            <a:ext cx="1452981" cy="719328"/>
-          </a:xfrm>
-          <a:prstGeom prst="ellipse">
-            <a:avLst/>
-          </a:prstGeom>
-          <a:ln>
-            <a:solidFill>
-              <a:schemeClr val="tx1"/>
-            </a:solidFill>
-          </a:ln>
-        </p:spPr>
-        <p:style>
-          <a:lnRef idx="2">
-            <a:schemeClr val="accent6"/>
-          </a:lnRef>
-          <a:fillRef idx="1">
-            <a:schemeClr val="lt1"/>
-          </a:fillRef>
-          <a:effectRef idx="0">
-            <a:schemeClr val="accent6"/>
-          </a:effectRef>
-          <a:fontRef idx="minor">
-            <a:schemeClr val="dk1"/>
-          </a:fontRef>
-        </p:style>
-        <p:txBody>
-          <a:bodyPr rtlCol="0" anchor="ctr"/>
-          <a:lstStyle/>
-          <a:p>
-            <a:pPr algn="ctr"/>
-            <a:r>
-              <a:rPr lang="en-US" dirty="0" smtClean="0"/>
-              <a:t>Bucket List</a:t>
-            </a:r>
-            <a:endParaRPr lang="en-US" dirty="0"/>
-          </a:p>
-        </p:txBody>
-      </p:sp>
-      <p:sp>
-        <p:nvSpPr>
-          <p:cNvPr id="15" name="Rectangle 14"/>
-          <p:cNvSpPr/>
-          <p:nvPr/>
-        </p:nvSpPr>
-        <p:spPr>
-          <a:xfrm>
-            <a:off x="1547664" y="1405620"/>
-            <a:ext cx="2160240" cy="3823580"/>
-          </a:xfrm>
-          <a:prstGeom prst="rect">
-            <a:avLst/>
-          </a:prstGeom>
-          <a:noFill/>
-          <a:ln>
-            <a:solidFill>
-              <a:schemeClr val="tx1"/>
-            </a:solidFill>
-          </a:ln>
-        </p:spPr>
-        <p:style>
-          <a:lnRef idx="2">
-            <a:schemeClr val="accent1">
-              <a:shade val="50000"/>
-            </a:schemeClr>
-          </a:lnRef>
-          <a:fillRef idx="1">
-            <a:schemeClr val="accent1"/>
-          </a:fillRef>
-          <a:effectRef idx="0">
-            <a:schemeClr val="accent1"/>
-          </a:effectRef>
-          <a:fontRef idx="minor">
-            <a:schemeClr val="lt1"/>
-          </a:fontRef>
-        </p:style>
-        <p:txBody>
-          <a:bodyPr rtlCol="0" anchor="ctr"/>
-          <a:lstStyle/>
-          <a:p>
-            <a:pPr algn="ctr"/>
-            <a:endParaRPr lang="en-US" dirty="0"/>
-          </a:p>
-        </p:txBody>
-      </p:sp>
-      <p:sp>
-        <p:nvSpPr>
-          <p:cNvPr id="16" name="Rectangle 15"/>
-          <p:cNvSpPr/>
-          <p:nvPr/>
-        </p:nvSpPr>
-        <p:spPr>
-          <a:xfrm>
-            <a:off x="6660232" y="1412776"/>
-            <a:ext cx="2160240" cy="3823580"/>
-          </a:xfrm>
-          <a:prstGeom prst="rect">
-            <a:avLst/>
-          </a:prstGeom>
-          <a:noFill/>
-          <a:ln>
-            <a:solidFill>
-              <a:schemeClr val="tx1"/>
-            </a:solidFill>
-          </a:ln>
-        </p:spPr>
-        <p:style>
-          <a:lnRef idx="2">
-            <a:schemeClr val="accent1">
-              <a:shade val="50000"/>
-            </a:schemeClr>
-          </a:lnRef>
-          <a:fillRef idx="1">
-            <a:schemeClr val="accent1"/>
-          </a:fillRef>
-          <a:effectRef idx="0">
-            <a:schemeClr val="accent1"/>
-          </a:effectRef>
-          <a:fontRef idx="minor">
-            <a:schemeClr val="lt1"/>
-          </a:fontRef>
-        </p:style>
-        <p:txBody>
-          <a:bodyPr rtlCol="0" anchor="ctr"/>
-          <a:lstStyle/>
-          <a:p>
-            <a:pPr algn="ctr"/>
-            <a:endParaRPr lang="en-US" dirty="0"/>
-          </a:p>
-        </p:txBody>
-      </p:sp>
-      <p:sp>
-        <p:nvSpPr>
           <p:cNvPr id="17" name="Oval 16"/>
           <p:cNvSpPr/>
           <p:nvPr/>
         </p:nvSpPr>
         <p:spPr>
           <a:xfrm>
-            <a:off x="1763688" y="2083729"/>
+            <a:off x="2483768" y="1844824"/>
             <a:ext cx="1723803" cy="697199"/>
           </a:xfrm>
           <a:prstGeom prst="ellipse">
@@ -3550,7 +3446,7 @@
         </p:nvSpPr>
         <p:spPr>
           <a:xfrm>
-            <a:off x="1763688" y="3789040"/>
+            <a:off x="3203848" y="3356992"/>
             <a:ext cx="1723803" cy="697199"/>
           </a:xfrm>
           <a:prstGeom prst="ellipse">
@@ -3597,7 +3493,7 @@
         </p:nvSpPr>
         <p:spPr>
           <a:xfrm>
-            <a:off x="6880645" y="2155737"/>
+            <a:off x="5508104" y="2852936"/>
             <a:ext cx="1723803" cy="697199"/>
           </a:xfrm>
           <a:prstGeom prst="ellipse">
@@ -3636,65 +3532,19 @@
           </a:p>
         </p:txBody>
       </p:sp>
-      <p:sp>
-        <p:nvSpPr>
-          <p:cNvPr id="20" name="Oval 19"/>
-          <p:cNvSpPr/>
-          <p:nvPr/>
-        </p:nvSpPr>
-        <p:spPr>
-          <a:xfrm>
-            <a:off x="7007451" y="3817176"/>
-            <a:ext cx="1452981" cy="719328"/>
-          </a:xfrm>
-          <a:prstGeom prst="ellipse">
-            <a:avLst/>
-          </a:prstGeom>
-          <a:ln>
-            <a:solidFill>
-              <a:schemeClr val="tx1"/>
-            </a:solidFill>
-          </a:ln>
-        </p:spPr>
-        <p:style>
-          <a:lnRef idx="2">
-            <a:schemeClr val="accent6"/>
-          </a:lnRef>
-          <a:fillRef idx="1">
-            <a:schemeClr val="lt1"/>
-          </a:fillRef>
-          <a:effectRef idx="0">
-            <a:schemeClr val="accent6"/>
-          </a:effectRef>
-          <a:fontRef idx="minor">
-            <a:schemeClr val="dk1"/>
-          </a:fontRef>
-        </p:style>
-        <p:txBody>
-          <a:bodyPr rtlCol="0" anchor="ctr"/>
-          <a:lstStyle/>
-          <a:p>
-            <a:pPr algn="ctr"/>
-            <a:r>
-              <a:rPr lang="en-US" dirty="0" smtClean="0"/>
-              <a:t>Logout</a:t>
-            </a:r>
-            <a:endParaRPr lang="en-US" dirty="0"/>
-          </a:p>
-        </p:txBody>
-      </p:sp>
       <p:cxnSp>
         <p:nvCxnSpPr>
-          <p:cNvPr id="22" name="Straight Arrow Connector 21"/>
+          <p:cNvPr id="13" name="Straight Arrow Connector 12"/>
           <p:cNvCxnSpPr>
+            <a:stCxn id="10" idx="3"/>
             <a:endCxn id="17" idx="2"/>
           </p:cNvCxnSpPr>
           <p:nvPr/>
         </p:nvCxnSpPr>
         <p:spPr>
           <a:xfrm flipV="1">
-            <a:off x="1115616" y="2432329"/>
-            <a:ext cx="648072" cy="852655"/>
+            <a:off x="1362426" y="2193424"/>
+            <a:ext cx="1121342" cy="1308350"/>
           </a:xfrm>
           <a:prstGeom prst="straightConnector1">
             <a:avLst/>
@@ -3704,13 +3554,13 @@
           </a:ln>
         </p:spPr>
         <p:style>
-          <a:lnRef idx="1">
+          <a:lnRef idx="2">
             <a:schemeClr val="dk1"/>
           </a:lnRef>
           <a:fillRef idx="0">
             <a:schemeClr val="dk1"/>
           </a:fillRef>
-          <a:effectRef idx="0">
+          <a:effectRef idx="1">
             <a:schemeClr val="dk1"/>
           </a:effectRef>
           <a:fontRef idx="minor">
@@ -3720,16 +3570,17 @@
       </p:cxnSp>
       <p:cxnSp>
         <p:nvCxnSpPr>
-          <p:cNvPr id="24" name="Straight Arrow Connector 23"/>
+          <p:cNvPr id="23" name="Straight Arrow Connector 22"/>
           <p:cNvCxnSpPr>
+            <a:stCxn id="10" idx="3"/>
             <a:endCxn id="18" idx="2"/>
           </p:cNvCxnSpPr>
           <p:nvPr/>
         </p:nvCxnSpPr>
         <p:spPr>
           <a:xfrm>
-            <a:off x="1115616" y="3284984"/>
-            <a:ext cx="648072" cy="852656"/>
+            <a:off x="1362426" y="3501774"/>
+            <a:ext cx="1841422" cy="203818"/>
           </a:xfrm>
           <a:prstGeom prst="straightConnector1">
             <a:avLst/>
@@ -3739,13 +3590,13 @@
           </a:ln>
         </p:spPr>
         <p:style>
-          <a:lnRef idx="1">
+          <a:lnRef idx="2">
             <a:schemeClr val="dk1"/>
           </a:lnRef>
           <a:fillRef idx="0">
             <a:schemeClr val="dk1"/>
           </a:fillRef>
-          <a:effectRef idx="0">
+          <a:effectRef idx="1">
             <a:schemeClr val="dk1"/>
           </a:effectRef>
           <a:fontRef idx="minor">
@@ -3755,17 +3606,17 @@
       </p:cxnSp>
       <p:cxnSp>
         <p:nvCxnSpPr>
-          <p:cNvPr id="28" name="Straight Arrow Connector 27"/>
+          <p:cNvPr id="26" name="Straight Arrow Connector 25"/>
           <p:cNvCxnSpPr>
-            <a:stCxn id="17" idx="6"/>
+            <a:stCxn id="10" idx="3"/>
             <a:endCxn id="4" idx="2"/>
           </p:cNvCxnSpPr>
           <p:nvPr/>
         </p:nvCxnSpPr>
         <p:spPr>
-          <a:xfrm flipV="1">
-            <a:off x="3487491" y="1849759"/>
-            <a:ext cx="818962" cy="582570"/>
+          <a:xfrm>
+            <a:off x="1362426" y="3501774"/>
+            <a:ext cx="1481382" cy="1355946"/>
           </a:xfrm>
           <a:prstGeom prst="straightConnector1">
             <a:avLst/>
@@ -3775,13 +3626,13 @@
           </a:ln>
         </p:spPr>
         <p:style>
-          <a:lnRef idx="1">
+          <a:lnRef idx="2">
             <a:schemeClr val="dk1"/>
           </a:lnRef>
           <a:fillRef idx="0">
             <a:schemeClr val="dk1"/>
           </a:fillRef>
-          <a:effectRef idx="0">
+          <a:effectRef idx="1">
             <a:schemeClr val="dk1"/>
           </a:effectRef>
           <a:fontRef idx="minor">
@@ -3791,17 +3642,17 @@
       </p:cxnSp>
       <p:cxnSp>
         <p:nvCxnSpPr>
-          <p:cNvPr id="32" name="Straight Arrow Connector 31"/>
+          <p:cNvPr id="29" name="Straight Arrow Connector 28"/>
           <p:cNvCxnSpPr>
-            <a:stCxn id="17" idx="6"/>
+            <a:stCxn id="10" idx="3"/>
             <a:endCxn id="12" idx="2"/>
           </p:cNvCxnSpPr>
           <p:nvPr/>
         </p:nvCxnSpPr>
         <p:spPr>
-          <a:xfrm>
-            <a:off x="3487491" y="2432329"/>
-            <a:ext cx="792146" cy="413014"/>
+          <a:xfrm flipV="1">
+            <a:off x="1362426" y="2200696"/>
+            <a:ext cx="3425598" cy="1301078"/>
           </a:xfrm>
           <a:prstGeom prst="straightConnector1">
             <a:avLst/>
@@ -3811,13 +3662,13 @@
           </a:ln>
         </p:spPr>
         <p:style>
-          <a:lnRef idx="1">
+          <a:lnRef idx="2">
             <a:schemeClr val="dk1"/>
           </a:lnRef>
           <a:fillRef idx="0">
             <a:schemeClr val="dk1"/>
           </a:fillRef>
-          <a:effectRef idx="0">
+          <a:effectRef idx="1">
             <a:schemeClr val="dk1"/>
           </a:effectRef>
           <a:fontRef idx="minor">
@@ -3827,17 +3678,17 @@
       </p:cxnSp>
       <p:cxnSp>
         <p:nvCxnSpPr>
-          <p:cNvPr id="34" name="Straight Arrow Connector 33"/>
+          <p:cNvPr id="31" name="Straight Arrow Connector 30"/>
           <p:cNvCxnSpPr>
-            <a:stCxn id="17" idx="6"/>
-            <a:endCxn id="14" idx="2"/>
+            <a:stCxn id="10" idx="3"/>
+            <a:endCxn id="19" idx="2"/>
           </p:cNvCxnSpPr>
           <p:nvPr/>
         </p:nvCxnSpPr>
         <p:spPr>
-          <a:xfrm>
-            <a:off x="3487491" y="2432329"/>
-            <a:ext cx="999680" cy="1387530"/>
+          <a:xfrm flipV="1">
+            <a:off x="1362426" y="3201536"/>
+            <a:ext cx="4145678" cy="300238"/>
           </a:xfrm>
           <a:prstGeom prst="straightConnector1">
             <a:avLst/>
@@ -3847,13 +3698,13 @@
           </a:ln>
         </p:spPr>
         <p:style>
-          <a:lnRef idx="1">
+          <a:lnRef idx="2">
             <a:schemeClr val="dk1"/>
           </a:lnRef>
           <a:fillRef idx="0">
             <a:schemeClr val="dk1"/>
           </a:fillRef>
-          <a:effectRef idx="0">
+          <a:effectRef idx="1">
             <a:schemeClr val="dk1"/>
           </a:effectRef>
           <a:fontRef idx="minor">
@@ -3863,17 +3714,17 @@
       </p:cxnSp>
       <p:cxnSp>
         <p:nvCxnSpPr>
-          <p:cNvPr id="38" name="Straight Arrow Connector 37"/>
+          <p:cNvPr id="41" name="Straight Arrow Connector 40"/>
           <p:cNvCxnSpPr>
-            <a:stCxn id="17" idx="6"/>
-            <a:endCxn id="5" idx="2"/>
+            <a:stCxn id="10" idx="3"/>
+            <a:endCxn id="14" idx="2"/>
           </p:cNvCxnSpPr>
           <p:nvPr/>
         </p:nvCxnSpPr>
         <p:spPr>
           <a:xfrm>
-            <a:off x="3487491" y="2432329"/>
-            <a:ext cx="991663" cy="2309566"/>
+            <a:off x="1362426" y="3501774"/>
+            <a:ext cx="4145678" cy="1063757"/>
           </a:xfrm>
           <a:prstGeom prst="straightConnector1">
             <a:avLst/>
@@ -3883,13 +3734,13 @@
           </a:ln>
         </p:spPr>
         <p:style>
-          <a:lnRef idx="1">
+          <a:lnRef idx="2">
             <a:schemeClr val="dk1"/>
           </a:lnRef>
           <a:fillRef idx="0">
             <a:schemeClr val="dk1"/>
           </a:fillRef>
-          <a:effectRef idx="0">
+          <a:effectRef idx="1">
             <a:schemeClr val="dk1"/>
           </a:effectRef>
           <a:fontRef idx="minor">
@@ -3899,17 +3750,17 @@
       </p:cxnSp>
       <p:cxnSp>
         <p:nvCxnSpPr>
-          <p:cNvPr id="40" name="Straight Arrow Connector 39"/>
+          <p:cNvPr id="50" name="Straight Arrow Connector 49"/>
           <p:cNvCxnSpPr>
-            <a:stCxn id="18" idx="0"/>
-            <a:endCxn id="17" idx="4"/>
+            <a:stCxn id="10" idx="3"/>
+            <a:endCxn id="5" idx="2"/>
           </p:cNvCxnSpPr>
           <p:nvPr/>
         </p:nvCxnSpPr>
         <p:spPr>
-          <a:xfrm flipV="1">
-            <a:off x="2625590" y="2780928"/>
-            <a:ext cx="0" cy="1008112"/>
+          <a:xfrm>
+            <a:off x="1362426" y="3501774"/>
+            <a:ext cx="1985438" cy="2447130"/>
           </a:xfrm>
           <a:prstGeom prst="straightConnector1">
             <a:avLst/>
@@ -3919,305 +3770,13 @@
           </a:ln>
         </p:spPr>
         <p:style>
-          <a:lnRef idx="1">
+          <a:lnRef idx="2">
             <a:schemeClr val="dk1"/>
           </a:lnRef>
           <a:fillRef idx="0">
             <a:schemeClr val="dk1"/>
           </a:fillRef>
-          <a:effectRef idx="0">
-            <a:schemeClr val="dk1"/>
-          </a:effectRef>
-          <a:fontRef idx="minor">
-            <a:schemeClr val="tx1"/>
-          </a:fontRef>
-        </p:style>
-      </p:cxnSp>
-      <p:cxnSp>
-        <p:nvCxnSpPr>
-          <p:cNvPr id="44" name="Straight Arrow Connector 43"/>
-          <p:cNvCxnSpPr>
-            <a:stCxn id="14" idx="6"/>
-            <a:endCxn id="19" idx="2"/>
-          </p:cNvCxnSpPr>
-          <p:nvPr/>
-        </p:nvCxnSpPr>
-        <p:spPr>
-          <a:xfrm flipV="1">
-            <a:off x="5940152" y="2504337"/>
-            <a:ext cx="940493" cy="1315522"/>
-          </a:xfrm>
-          <a:prstGeom prst="straightConnector1">
-            <a:avLst/>
-          </a:prstGeom>
-          <a:ln>
-            <a:tailEnd type="arrow"/>
-          </a:ln>
-        </p:spPr>
-        <p:style>
-          <a:lnRef idx="1">
-            <a:schemeClr val="dk1"/>
-          </a:lnRef>
-          <a:fillRef idx="0">
-            <a:schemeClr val="dk1"/>
-          </a:fillRef>
-          <a:effectRef idx="0">
-            <a:schemeClr val="dk1"/>
-          </a:effectRef>
-          <a:fontRef idx="minor">
-            <a:schemeClr val="tx1"/>
-          </a:fontRef>
-        </p:style>
-      </p:cxnSp>
-      <p:cxnSp>
-        <p:nvCxnSpPr>
-          <p:cNvPr id="46" name="Straight Arrow Connector 45"/>
-          <p:cNvCxnSpPr>
-            <a:stCxn id="14" idx="6"/>
-            <a:endCxn id="20" idx="2"/>
-          </p:cNvCxnSpPr>
-          <p:nvPr/>
-        </p:nvCxnSpPr>
-        <p:spPr>
-          <a:xfrm>
-            <a:off x="5940152" y="3819859"/>
-            <a:ext cx="1067299" cy="356981"/>
-          </a:xfrm>
-          <a:prstGeom prst="straightConnector1">
-            <a:avLst/>
-          </a:prstGeom>
-          <a:ln>
-            <a:tailEnd type="arrow"/>
-          </a:ln>
-        </p:spPr>
-        <p:style>
-          <a:lnRef idx="1">
-            <a:schemeClr val="dk1"/>
-          </a:lnRef>
-          <a:fillRef idx="0">
-            <a:schemeClr val="dk1"/>
-          </a:fillRef>
-          <a:effectRef idx="0">
-            <a:schemeClr val="dk1"/>
-          </a:effectRef>
-          <a:fontRef idx="minor">
-            <a:schemeClr val="tx1"/>
-          </a:fontRef>
-        </p:style>
-      </p:cxnSp>
-      <p:sp>
-        <p:nvSpPr>
-          <p:cNvPr id="47" name="TextBox 46"/>
-          <p:cNvSpPr txBox="1"/>
-          <p:nvPr/>
-        </p:nvSpPr>
-        <p:spPr>
-          <a:xfrm>
-            <a:off x="1835696" y="980728"/>
-            <a:ext cx="1440160" cy="369332"/>
-          </a:xfrm>
-          <a:prstGeom prst="rect">
-            <a:avLst/>
-          </a:prstGeom>
-          <a:noFill/>
-        </p:spPr>
-        <p:txBody>
-          <a:bodyPr wrap="square" rtlCol="0">
-            <a:spAutoFit/>
-          </a:bodyPr>
-          <a:lstStyle/>
-          <a:p>
-            <a:pPr algn="ctr"/>
-            <a:r>
-              <a:rPr lang="en-US" b="1" dirty="0" smtClean="0"/>
-              <a:t>Intro page</a:t>
-            </a:r>
-            <a:endParaRPr lang="en-IN" b="1" dirty="0"/>
-          </a:p>
-        </p:txBody>
-      </p:sp>
-      <p:sp>
-        <p:nvSpPr>
-          <p:cNvPr id="48" name="TextBox 47"/>
-          <p:cNvSpPr txBox="1"/>
-          <p:nvPr/>
-        </p:nvSpPr>
-        <p:spPr>
-          <a:xfrm>
-            <a:off x="4427984" y="980728"/>
-            <a:ext cx="1440160" cy="369332"/>
-          </a:xfrm>
-          <a:prstGeom prst="rect">
-            <a:avLst/>
-          </a:prstGeom>
-          <a:noFill/>
-        </p:spPr>
-        <p:txBody>
-          <a:bodyPr wrap="square" rtlCol="0">
-            <a:spAutoFit/>
-          </a:bodyPr>
-          <a:lstStyle/>
-          <a:p>
-            <a:pPr algn="ctr"/>
-            <a:r>
-              <a:rPr lang="en-US" b="1" dirty="0" smtClean="0"/>
-              <a:t>Home page</a:t>
-            </a:r>
-            <a:endParaRPr lang="en-IN" b="1" dirty="0"/>
-          </a:p>
-        </p:txBody>
-      </p:sp>
-      <p:sp>
-        <p:nvSpPr>
-          <p:cNvPr id="49" name="TextBox 48"/>
-          <p:cNvSpPr txBox="1"/>
-          <p:nvPr/>
-        </p:nvSpPr>
-        <p:spPr>
-          <a:xfrm>
-            <a:off x="6948264" y="980728"/>
-            <a:ext cx="1440160" cy="369332"/>
-          </a:xfrm>
-          <a:prstGeom prst="rect">
-            <a:avLst/>
-          </a:prstGeom>
-          <a:noFill/>
-        </p:spPr>
-        <p:txBody>
-          <a:bodyPr wrap="square" rtlCol="0">
-            <a:spAutoFit/>
-          </a:bodyPr>
-          <a:lstStyle/>
-          <a:p>
-            <a:pPr algn="ctr"/>
-            <a:r>
-              <a:rPr lang="en-US" b="1" dirty="0" smtClean="0"/>
-              <a:t>Bucket page</a:t>
-            </a:r>
-            <a:endParaRPr lang="en-IN" b="1" dirty="0"/>
-          </a:p>
-        </p:txBody>
-      </p:sp>
-      <p:cxnSp>
-        <p:nvCxnSpPr>
-          <p:cNvPr id="53" name="Straight Arrow Connector 52"/>
-          <p:cNvCxnSpPr/>
-          <p:nvPr/>
-        </p:nvCxnSpPr>
-        <p:spPr>
-          <a:xfrm flipV="1">
-            <a:off x="1115616" y="3284984"/>
-            <a:ext cx="0" cy="2880320"/>
-          </a:xfrm>
-          <a:prstGeom prst="straightConnector1">
-            <a:avLst/>
-          </a:prstGeom>
-          <a:ln>
-            <a:tailEnd type="arrow"/>
-          </a:ln>
-        </p:spPr>
-        <p:style>
-          <a:lnRef idx="1">
-            <a:schemeClr val="dk1"/>
-          </a:lnRef>
-          <a:fillRef idx="0">
-            <a:schemeClr val="dk1"/>
-          </a:fillRef>
-          <a:effectRef idx="0">
-            <a:schemeClr val="dk1"/>
-          </a:effectRef>
-          <a:fontRef idx="minor">
-            <a:schemeClr val="tx1"/>
-          </a:fontRef>
-        </p:style>
-      </p:cxnSp>
-      <p:cxnSp>
-        <p:nvCxnSpPr>
-          <p:cNvPr id="55" name="Straight Connector 54"/>
-          <p:cNvCxnSpPr/>
-          <p:nvPr/>
-        </p:nvCxnSpPr>
-        <p:spPr>
-          <a:xfrm>
-            <a:off x="1115616" y="6165304"/>
-            <a:ext cx="6624736" cy="0"/>
-          </a:xfrm>
-          <a:prstGeom prst="line">
-            <a:avLst/>
-          </a:prstGeom>
-        </p:spPr>
-        <p:style>
-          <a:lnRef idx="1">
-            <a:schemeClr val="dk1"/>
-          </a:lnRef>
-          <a:fillRef idx="0">
-            <a:schemeClr val="dk1"/>
-          </a:fillRef>
-          <a:effectRef idx="0">
-            <a:schemeClr val="dk1"/>
-          </a:effectRef>
-          <a:fontRef idx="minor">
-            <a:schemeClr val="tx1"/>
-          </a:fontRef>
-        </p:style>
-      </p:cxnSp>
-      <p:cxnSp>
-        <p:nvCxnSpPr>
-          <p:cNvPr id="57" name="Straight Connector 56"/>
-          <p:cNvCxnSpPr>
-            <a:stCxn id="5" idx="4"/>
-          </p:cNvCxnSpPr>
-          <p:nvPr/>
-        </p:nvCxnSpPr>
-        <p:spPr>
-          <a:xfrm>
-            <a:off x="5205645" y="5101559"/>
-            <a:ext cx="14427" cy="1063745"/>
-          </a:xfrm>
-          <a:prstGeom prst="line">
-            <a:avLst/>
-          </a:prstGeom>
-        </p:spPr>
-        <p:style>
-          <a:lnRef idx="1">
-            <a:schemeClr val="dk1"/>
-          </a:lnRef>
-          <a:fillRef idx="0">
-            <a:schemeClr val="dk1"/>
-          </a:fillRef>
-          <a:effectRef idx="0">
-            <a:schemeClr val="dk1"/>
-          </a:effectRef>
-          <a:fontRef idx="minor">
-            <a:schemeClr val="tx1"/>
-          </a:fontRef>
-        </p:style>
-      </p:cxnSp>
-      <p:cxnSp>
-        <p:nvCxnSpPr>
-          <p:cNvPr id="59" name="Straight Connector 58"/>
-          <p:cNvCxnSpPr>
-            <a:stCxn id="20" idx="4"/>
-          </p:cNvCxnSpPr>
-          <p:nvPr/>
-        </p:nvCxnSpPr>
-        <p:spPr>
-          <a:xfrm>
-            <a:off x="7733942" y="4536504"/>
-            <a:ext cx="6410" cy="1628800"/>
-          </a:xfrm>
-          <a:prstGeom prst="line">
-            <a:avLst/>
-          </a:prstGeom>
-        </p:spPr>
-        <p:style>
-          <a:lnRef idx="1">
-            <a:schemeClr val="dk1"/>
-          </a:lnRef>
-          <a:fillRef idx="0">
-            <a:schemeClr val="dk1"/>
-          </a:fillRef>
-          <a:effectRef idx="0">
+          <a:effectRef idx="1">
             <a:schemeClr val="dk1"/>
           </a:effectRef>
           <a:fontRef idx="minor">

</xml_diff>